<commit_message>
REvisando bancos de dados e slides
</commit_message>
<xml_diff>
--- a/Trabalho Escrito & Banco de Dados/Trabalho de Conclusão de Curso - Health++.pptx
+++ b/Trabalho Escrito & Banco de Dados/Trabalho de Conclusão de Curso - Health++.pptx
@@ -126,6 +126,14 @@
 </p:presentation>
 </file>
 
+<file path=ppt/revisionInfo.xml><?xml version="1.0" encoding="utf-8"?>
+<p1510:revInfo xmlns:a="http://schemas.openxmlformats.org/drawingml/2006/main" xmlns:r="http://schemas.openxmlformats.org/officeDocument/2006/relationships" xmlns:p1510="http://schemas.microsoft.com/office/powerpoint/2015/10/main">
+  <p1510:revLst>
+    <p1510:client id="{51D278AD-1873-433B-9508-550C10BDB15E}" v="412" dt="2022-12-04T19:41:24.580"/>
+  </p1510:revLst>
+</p1510:revInfo>
+</file>
+
 <file path=ppt/slideLayouts/slideLayout1.xml><?xml version="1.0" encoding="utf-8"?>
 <p:sldLayout xmlns:a="http://schemas.openxmlformats.org/drawingml/2006/main" xmlns:r="http://schemas.openxmlformats.org/officeDocument/2006/relationships" xmlns:p="http://schemas.openxmlformats.org/presentationml/2006/main" type="title" preserve="1">
   <p:cSld name="Slide de Título">
@@ -273,7 +281,7 @@
           <a:p>
             <a:fld id="{04BA4C19-A2B5-45E9-89A1-7F815423A50E}" type="datetimeFigureOut">
               <a:rPr lang="pt-BR" smtClean="0"/>
-              <a:t>30/11/2022</a:t>
+              <a:t>09/12/2022</a:t>
             </a:fld>
             <a:endParaRPr lang="pt-BR"/>
           </a:p>
@@ -483,7 +491,7 @@
           <a:p>
             <a:fld id="{04BA4C19-A2B5-45E9-89A1-7F815423A50E}" type="datetimeFigureOut">
               <a:rPr lang="pt-BR" smtClean="0"/>
-              <a:t>30/11/2022</a:t>
+              <a:t>09/12/2022</a:t>
             </a:fld>
             <a:endParaRPr lang="pt-BR"/>
           </a:p>
@@ -703,7 +711,7 @@
           <a:p>
             <a:fld id="{04BA4C19-A2B5-45E9-89A1-7F815423A50E}" type="datetimeFigureOut">
               <a:rPr lang="pt-BR" smtClean="0"/>
-              <a:t>30/11/2022</a:t>
+              <a:t>09/12/2022</a:t>
             </a:fld>
             <a:endParaRPr lang="pt-BR"/>
           </a:p>
@@ -913,7 +921,7 @@
           <a:p>
             <a:fld id="{04BA4C19-A2B5-45E9-89A1-7F815423A50E}" type="datetimeFigureOut">
               <a:rPr lang="pt-BR" smtClean="0"/>
-              <a:t>30/11/2022</a:t>
+              <a:t>09/12/2022</a:t>
             </a:fld>
             <a:endParaRPr lang="pt-BR"/>
           </a:p>
@@ -1200,7 +1208,7 @@
           <a:p>
             <a:fld id="{04BA4C19-A2B5-45E9-89A1-7F815423A50E}" type="datetimeFigureOut">
               <a:rPr lang="pt-BR" smtClean="0"/>
-              <a:t>30/11/2022</a:t>
+              <a:t>09/12/2022</a:t>
             </a:fld>
             <a:endParaRPr lang="pt-BR"/>
           </a:p>
@@ -1477,7 +1485,7 @@
           <a:p>
             <a:fld id="{04BA4C19-A2B5-45E9-89A1-7F815423A50E}" type="datetimeFigureOut">
               <a:rPr lang="pt-BR" smtClean="0"/>
-              <a:t>30/11/2022</a:t>
+              <a:t>09/12/2022</a:t>
             </a:fld>
             <a:endParaRPr lang="pt-BR"/>
           </a:p>
@@ -1901,7 +1909,7 @@
           <a:p>
             <a:fld id="{04BA4C19-A2B5-45E9-89A1-7F815423A50E}" type="datetimeFigureOut">
               <a:rPr lang="pt-BR" smtClean="0"/>
-              <a:t>30/11/2022</a:t>
+              <a:t>09/12/2022</a:t>
             </a:fld>
             <a:endParaRPr lang="pt-BR"/>
           </a:p>
@@ -2054,7 +2062,7 @@
           <a:p>
             <a:fld id="{04BA4C19-A2B5-45E9-89A1-7F815423A50E}" type="datetimeFigureOut">
               <a:rPr lang="pt-BR" smtClean="0"/>
-              <a:t>30/11/2022</a:t>
+              <a:t>09/12/2022</a:t>
             </a:fld>
             <a:endParaRPr lang="pt-BR"/>
           </a:p>
@@ -2179,7 +2187,7 @@
           <a:p>
             <a:fld id="{04BA4C19-A2B5-45E9-89A1-7F815423A50E}" type="datetimeFigureOut">
               <a:rPr lang="pt-BR" smtClean="0"/>
-              <a:t>30/11/2022</a:t>
+              <a:t>09/12/2022</a:t>
             </a:fld>
             <a:endParaRPr lang="pt-BR"/>
           </a:p>
@@ -2502,7 +2510,7 @@
           <a:p>
             <a:fld id="{04BA4C19-A2B5-45E9-89A1-7F815423A50E}" type="datetimeFigureOut">
               <a:rPr lang="pt-BR" smtClean="0"/>
-              <a:t>30/11/2022</a:t>
+              <a:t>09/12/2022</a:t>
             </a:fld>
             <a:endParaRPr lang="pt-BR"/>
           </a:p>
@@ -2802,7 +2810,7 @@
           <a:p>
             <a:fld id="{04BA4C19-A2B5-45E9-89A1-7F815423A50E}" type="datetimeFigureOut">
               <a:rPr lang="pt-BR" smtClean="0"/>
-              <a:t>30/11/2022</a:t>
+              <a:t>09/12/2022</a:t>
             </a:fld>
             <a:endParaRPr lang="pt-BR"/>
           </a:p>
@@ -3055,7 +3063,7 @@
           <a:p>
             <a:fld id="{04BA4C19-A2B5-45E9-89A1-7F815423A50E}" type="datetimeFigureOut">
               <a:rPr lang="pt-BR" smtClean="0"/>
-              <a:t>30/11/2022</a:t>
+              <a:t>09/12/2022</a:t>
             </a:fld>
             <a:endParaRPr lang="pt-BR"/>
           </a:p>
@@ -3826,14 +3834,11 @@
           </a:lstStyle>
           <a:p>
             <a:r>
-              <a:rPr lang="pt-BR" dirty="0" smtClean="0">
+              <a:rPr lang="pt-BR" dirty="0">
                 <a:latin typeface="Century Gothic" panose="020B0502020202020204" pitchFamily="34" charset="0"/>
               </a:rPr>
               <a:t>Trabalho de Conclusão de Curso</a:t>
             </a:r>
-            <a:endParaRPr lang="pt-BR" dirty="0">
-              <a:latin typeface="Century Gothic" panose="020B0502020202020204" pitchFamily="34" charset="0"/>
-            </a:endParaRPr>
           </a:p>
         </p:txBody>
       </p:sp>
@@ -3849,23 +3854,12 @@
   </p:clrMapOvr>
   <mc:AlternateContent xmlns:mc="http://schemas.openxmlformats.org/markup-compatibility/2006" xmlns:p14="http://schemas.microsoft.com/office/powerpoint/2010/main">
     <mc:Choice Requires="p14">
-      <p:transition spd="slow" p14:dur="1500">
-        <p:cover dir="d"/>
-      </p:transition>
+      <p:transition p14:dur="0"/>
     </mc:Choice>
     <mc:Fallback xmlns="">
-      <p:transition spd="slow">
-        <p:cover dir="d"/>
-      </p:transition>
+      <p:transition/>
     </mc:Fallback>
   </mc:AlternateContent>
-  <p:timing>
-    <p:tnLst>
-      <p:par>
-        <p:cTn id="1" dur="indefinite" restart="never" nodeType="tmRoot"/>
-      </p:par>
-    </p:tnLst>
-  </p:timing>
 </p:sld>
 </file>
 
@@ -4067,49 +4061,32 @@
       </p:sp>
       <p:pic>
         <p:nvPicPr>
-          <p:cNvPr id="18434" name="Picture 2">
-            <a:extLst>
-              <a:ext uri="{FF2B5EF4-FFF2-40B4-BE49-F238E27FC236}">
-                <a16:creationId xmlns:a16="http://schemas.microsoft.com/office/drawing/2014/main" id="{563B3218-E647-0E0B-B0AA-7AAEA979B407}"/>
+          <p:cNvPr id="6" name="Imagem 6" descr="Diagrama&#10;&#10;Descrição gerada automaticamente">
+            <a:extLst>
+              <a:ext uri="{FF2B5EF4-FFF2-40B4-BE49-F238E27FC236}">
+                <a16:creationId xmlns:a16="http://schemas.microsoft.com/office/drawing/2014/main" id="{31284EF4-BFCF-B646-FE62-C4F2AB0F64FD}"/>
               </a:ext>
             </a:extLst>
           </p:cNvPr>
           <p:cNvPicPr>
-            <a:picLocks noChangeAspect="1" noChangeArrowheads="1"/>
+            <a:picLocks noChangeAspect="1"/>
           </p:cNvPicPr>
           <p:nvPr/>
         </p:nvPicPr>
         <p:blipFill>
-          <a:blip r:embed="rId4">
-            <a:extLst>
-              <a:ext uri="{28A0092B-C50C-407E-A947-70E740481C1C}">
-                <a14:useLocalDpi xmlns:a14="http://schemas.microsoft.com/office/drawing/2010/main" val="0"/>
-              </a:ext>
-            </a:extLst>
-          </a:blip>
-          <a:srcRect/>
+          <a:blip r:embed="rId4"/>
           <a:stretch>
             <a:fillRect/>
           </a:stretch>
         </p:blipFill>
-        <p:spPr bwMode="auto">
-          <a:xfrm>
-            <a:off x="2297323" y="2167434"/>
-            <a:ext cx="7597349" cy="3779838"/>
+        <p:spPr>
+          <a:xfrm>
+            <a:off x="1525773" y="2010769"/>
+            <a:ext cx="9131594" cy="4537670"/>
           </a:xfrm>
           <a:prstGeom prst="rect">
             <a:avLst/>
           </a:prstGeom>
-          <a:noFill/>
-          <a:extLst>
-            <a:ext uri="{909E8E84-426E-40DD-AFC4-6F175D3DCCD1}">
-              <a14:hiddenFill xmlns:a14="http://schemas.microsoft.com/office/drawing/2010/main">
-                <a:solidFill>
-                  <a:srgbClr val="FFFFFF"/>
-                </a:solidFill>
-              </a14:hiddenFill>
-            </a:ext>
-          </a:extLst>
         </p:spPr>
       </p:pic>
     </p:spTree>
@@ -4122,25 +4099,9 @@
   <p:clrMapOvr>
     <a:masterClrMapping/>
   </p:clrMapOvr>
-  <mc:AlternateContent xmlns:mc="http://schemas.openxmlformats.org/markup-compatibility/2006" xmlns:p14="http://schemas.microsoft.com/office/powerpoint/2010/main">
-    <mc:Choice Requires="p14">
-      <p:transition spd="slow" p14:dur="1500">
-        <p:cover dir="d"/>
-      </p:transition>
-    </mc:Choice>
-    <mc:Fallback xmlns="">
-      <p:transition spd="slow">
-        <p:cover dir="d"/>
-      </p:transition>
-    </mc:Fallback>
-  </mc:AlternateContent>
-  <p:timing>
-    <p:tnLst>
-      <p:par>
-        <p:cTn id="1" dur="indefinite" restart="never" nodeType="tmRoot"/>
-      </p:par>
-    </p:tnLst>
-  </p:timing>
+  <p:transition spd="slow">
+    <p:cover dir="d"/>
+  </p:transition>
 </p:sld>
 </file>
 
@@ -4293,7 +4254,7 @@
           <a:noFill/>
         </p:spPr>
         <p:txBody>
-          <a:bodyPr wrap="square" rtlCol="0">
+          <a:bodyPr wrap="square" lIns="91440" tIns="45720" rIns="91440" bIns="45720" rtlCol="0" anchor="t">
             <a:spAutoFit/>
           </a:bodyPr>
           <a:lstStyle/>
@@ -4321,9 +4282,28 @@
                   <a:srgbClr val="000000"/>
                 </a:solidFill>
                 <a:effectLst/>
-                <a:latin typeface="Century Gothic" panose="020B0502020202020204" pitchFamily="34" charset="0"/>
+                <a:latin typeface="Century Gothic"/>
               </a:rPr>
-              <a:t>Administrador cadastra novo Funcionário:</a:t>
+              <a:t>Administrador </a:t>
+            </a:r>
+            <a:r>
+              <a:rPr lang="pt-BR" sz="2000" dirty="0">
+                <a:solidFill>
+                  <a:srgbClr val="000000"/>
+                </a:solidFill>
+                <a:latin typeface="Century Gothic"/>
+              </a:rPr>
+              <a:t>edita</a:t>
+            </a:r>
+            <a:r>
+              <a:rPr lang="pt-BR" sz="2000" i="0" u="none" strike="noStrike" dirty="0">
+                <a:solidFill>
+                  <a:srgbClr val="000000"/>
+                </a:solidFill>
+                <a:effectLst/>
+                <a:latin typeface="Century Gothic"/>
+              </a:rPr>
+              <a:t> Funcionário:</a:t>
             </a:r>
             <a:endParaRPr kumimoji="0" lang="pt-BR" sz="2400" i="0" u="none" strike="noStrike" kern="1200" cap="none" spc="0" normalizeH="0" baseline="0" noProof="0" dirty="0">
               <a:ln>
@@ -4335,56 +4315,39 @@
               <a:effectLst/>
               <a:uLnTx/>
               <a:uFillTx/>
-              <a:latin typeface="Century Gothic" panose="020B0502020202020204" pitchFamily="34" charset="0"/>
+              <a:latin typeface="Century Gothic"/>
             </a:endParaRPr>
           </a:p>
         </p:txBody>
       </p:sp>
       <p:pic>
         <p:nvPicPr>
-          <p:cNvPr id="21506" name="Picture 2">
-            <a:extLst>
-              <a:ext uri="{FF2B5EF4-FFF2-40B4-BE49-F238E27FC236}">
-                <a16:creationId xmlns:a16="http://schemas.microsoft.com/office/drawing/2014/main" id="{84CECE12-EAF4-C4B8-4D88-0B6B5106D6D3}"/>
+          <p:cNvPr id="10" name="Imagem 10" descr="Diagrama&#10;&#10;Descrição gerada automaticamente">
+            <a:extLst>
+              <a:ext uri="{FF2B5EF4-FFF2-40B4-BE49-F238E27FC236}">
+                <a16:creationId xmlns:a16="http://schemas.microsoft.com/office/drawing/2014/main" id="{9A81347A-576C-D9AC-98A9-4CA560FC9843}"/>
               </a:ext>
             </a:extLst>
           </p:cNvPr>
           <p:cNvPicPr>
-            <a:picLocks noChangeAspect="1" noChangeArrowheads="1"/>
+            <a:picLocks noChangeAspect="1"/>
           </p:cNvPicPr>
           <p:nvPr/>
         </p:nvPicPr>
         <p:blipFill>
-          <a:blip r:embed="rId4">
-            <a:extLst>
-              <a:ext uri="{28A0092B-C50C-407E-A947-70E740481C1C}">
-                <a14:useLocalDpi xmlns:a14="http://schemas.microsoft.com/office/drawing/2010/main" val="0"/>
-              </a:ext>
-            </a:extLst>
-          </a:blip>
-          <a:srcRect/>
+          <a:blip r:embed="rId4"/>
           <a:stretch>
             <a:fillRect/>
           </a:stretch>
         </p:blipFill>
-        <p:spPr bwMode="auto">
-          <a:xfrm>
-            <a:off x="2297323" y="2167434"/>
-            <a:ext cx="7597349" cy="3779838"/>
+        <p:spPr>
+          <a:xfrm>
+            <a:off x="1694121" y="1922164"/>
+            <a:ext cx="8794897" cy="4369322"/>
           </a:xfrm>
           <a:prstGeom prst="rect">
             <a:avLst/>
           </a:prstGeom>
-          <a:noFill/>
-          <a:extLst>
-            <a:ext uri="{909E8E84-426E-40DD-AFC4-6F175D3DCCD1}">
-              <a14:hiddenFill xmlns:a14="http://schemas.microsoft.com/office/drawing/2010/main">
-                <a:solidFill>
-                  <a:srgbClr val="FFFFFF"/>
-                </a:solidFill>
-              </a14:hiddenFill>
-            </a:ext>
-          </a:extLst>
         </p:spPr>
       </p:pic>
     </p:spTree>
@@ -4397,25 +4360,9 @@
   <p:clrMapOvr>
     <a:masterClrMapping/>
   </p:clrMapOvr>
-  <mc:AlternateContent xmlns:mc="http://schemas.openxmlformats.org/markup-compatibility/2006" xmlns:p14="http://schemas.microsoft.com/office/powerpoint/2010/main">
-    <mc:Choice Requires="p14">
-      <p:transition spd="slow" p14:dur="1500">
-        <p:cover dir="d"/>
-      </p:transition>
-    </mc:Choice>
-    <mc:Fallback xmlns="">
-      <p:transition spd="slow">
-        <p:cover dir="d"/>
-      </p:transition>
-    </mc:Fallback>
-  </mc:AlternateContent>
-  <p:timing>
-    <p:tnLst>
-      <p:par>
-        <p:cTn id="1" dur="indefinite" restart="never" nodeType="tmRoot"/>
-      </p:par>
-    </p:tnLst>
-  </p:timing>
+  <p:transition spd="slow">
+    <p:cover dir="d"/>
+  </p:transition>
 </p:sld>
 </file>
 
@@ -4501,14 +4448,11 @@
           <a:lstStyle/>
           <a:p>
             <a:r>
-              <a:rPr lang="pt-BR" sz="4800" b="1" dirty="0" smtClean="0">
+              <a:rPr lang="pt-BR" sz="4800" b="1" dirty="0">
                 <a:latin typeface="Century Gothic" panose="020B0502020202020204" pitchFamily="34" charset="0"/>
               </a:rPr>
               <a:t>Demonstração Prática</a:t>
             </a:r>
-            <a:endParaRPr lang="pt-BR" sz="4800" b="1" dirty="0">
-              <a:latin typeface="Century Gothic" panose="020B0502020202020204" pitchFamily="34" charset="0"/>
-            </a:endParaRPr>
           </a:p>
         </p:txBody>
       </p:sp>
@@ -4558,25 +4502,9 @@
   <p:clrMapOvr>
     <a:masterClrMapping/>
   </p:clrMapOvr>
-  <mc:AlternateContent xmlns:mc="http://schemas.openxmlformats.org/markup-compatibility/2006" xmlns:p14="http://schemas.microsoft.com/office/powerpoint/2010/main">
-    <mc:Choice Requires="p14">
-      <p:transition spd="slow" p14:dur="1500">
-        <p:cover dir="d"/>
-      </p:transition>
-    </mc:Choice>
-    <mc:Fallback xmlns="">
-      <p:transition spd="slow">
-        <p:cover dir="d"/>
-      </p:transition>
-    </mc:Fallback>
-  </mc:AlternateContent>
-  <p:timing>
-    <p:tnLst>
-      <p:par>
-        <p:cTn id="1" dur="indefinite" restart="never" nodeType="tmRoot"/>
-      </p:par>
-    </p:tnLst>
-  </p:timing>
+  <p:transition spd="slow">
+    <p:cover dir="d"/>
+  </p:transition>
 </p:sld>
 </file>
 
@@ -4651,7 +4579,7 @@
         </p:nvSpPr>
         <p:spPr>
           <a:xfrm>
-            <a:off x="1877366" y="1005344"/>
+            <a:off x="1877366" y="3122995"/>
             <a:ext cx="8437266" cy="610987"/>
           </a:xfrm>
         </p:spPr>
@@ -4662,8 +4590,8 @@
           <a:lstStyle/>
           <a:p>
             <a:r>
-              <a:rPr lang="pt-BR" sz="4000" b="1" dirty="0">
-                <a:latin typeface="Century Gothic" panose="020B0502020202020204" pitchFamily="34" charset="0"/>
+              <a:rPr lang="pt-BR" sz="4800" b="1" dirty="0">
+                <a:latin typeface="Century Gothic"/>
               </a:rPr>
               <a:t>Considerações Finais</a:t>
             </a:r>
@@ -4722,7 +4650,7 @@
         </p:nvSpPr>
         <p:spPr>
           <a:xfrm>
-            <a:off x="1523999" y="2621675"/>
+            <a:off x="2117650" y="2028024"/>
             <a:ext cx="9144000" cy="2707882"/>
           </a:xfrm>
           <a:prstGeom prst="rect">
@@ -4730,7 +4658,7 @@
           </a:prstGeom>
         </p:spPr>
         <p:txBody>
-          <a:bodyPr vert="horz" lIns="91440" tIns="45720" rIns="91440" bIns="45720" numCol="2" rtlCol="0">
+          <a:bodyPr vert="horz" lIns="91440" tIns="45720" rIns="91440" bIns="45720" numCol="2" rtlCol="0" anchor="t">
             <a:noAutofit/>
           </a:bodyPr>
           <a:lstStyle>
@@ -4903,161 +4831,11 @@
                 <a:spcPct val="115000"/>
               </a:lnSpc>
             </a:pPr>
-            <a:r>
-              <a:rPr lang="pt-BR" sz="2000" b="1" dirty="0">
-                <a:effectLst/>
-                <a:latin typeface="Century Gothic" panose="020B0502020202020204" pitchFamily="34" charset="0"/>
-                <a:ea typeface="Arial" panose="020B0604020202020204" pitchFamily="34" charset="0"/>
-              </a:rPr>
-              <a:t>Ideia Inicial;</a:t>
-            </a:r>
             <a:endParaRPr lang="pt-BR" sz="2000" dirty="0">
               <a:effectLst/>
               <a:latin typeface="Century Gothic" panose="020B0502020202020204" pitchFamily="34" charset="0"/>
               <a:ea typeface="Arial" panose="020B0604020202020204" pitchFamily="34" charset="0"/>
             </a:endParaRPr>
-          </a:p>
-          <a:p>
-            <a:pPr>
-              <a:lnSpc>
-                <a:spcPct val="115000"/>
-              </a:lnSpc>
-            </a:pPr>
-            <a:r>
-              <a:rPr lang="pt-BR" sz="2000" dirty="0">
-                <a:effectLst/>
-                <a:latin typeface="Century Gothic" panose="020B0502020202020204" pitchFamily="34" charset="0"/>
-                <a:ea typeface="Arial" panose="020B0604020202020204" pitchFamily="34" charset="0"/>
-              </a:rPr>
-              <a:t>- Bot de conversa via Telegram.</a:t>
-            </a:r>
-          </a:p>
-          <a:p>
-            <a:pPr>
-              <a:lnSpc>
-                <a:spcPct val="115000"/>
-              </a:lnSpc>
-            </a:pPr>
-            <a:r>
-              <a:rPr lang="pt-BR" sz="2000" b="1" dirty="0">
-                <a:effectLst/>
-                <a:latin typeface="Century Gothic" panose="020B0502020202020204" pitchFamily="34" charset="0"/>
-                <a:ea typeface="Arial" panose="020B0604020202020204" pitchFamily="34" charset="0"/>
-              </a:rPr>
-              <a:t>Expansão das Funcionalidades;</a:t>
-            </a:r>
-            <a:endParaRPr lang="pt-BR" sz="2000" dirty="0">
-              <a:effectLst/>
-              <a:latin typeface="Century Gothic" panose="020B0502020202020204" pitchFamily="34" charset="0"/>
-              <a:ea typeface="Arial" panose="020B0604020202020204" pitchFamily="34" charset="0"/>
-            </a:endParaRPr>
-          </a:p>
-          <a:p>
-            <a:pPr>
-              <a:lnSpc>
-                <a:spcPct val="115000"/>
-              </a:lnSpc>
-            </a:pPr>
-            <a:r>
-              <a:rPr lang="pt-BR" sz="2000" dirty="0">
-                <a:effectLst/>
-                <a:latin typeface="Century Gothic" panose="020B0502020202020204" pitchFamily="34" charset="0"/>
-                <a:ea typeface="Arial" panose="020B0604020202020204" pitchFamily="34" charset="0"/>
-              </a:rPr>
-              <a:t>- Sistema de Busca;</a:t>
-            </a:r>
-          </a:p>
-          <a:p>
-            <a:pPr>
-              <a:lnSpc>
-                <a:spcPct val="115000"/>
-              </a:lnSpc>
-            </a:pPr>
-            <a:r>
-              <a:rPr lang="pt-BR" sz="2000" dirty="0">
-                <a:effectLst/>
-                <a:latin typeface="Century Gothic" panose="020B0502020202020204" pitchFamily="34" charset="0"/>
-                <a:ea typeface="Arial" panose="020B0604020202020204" pitchFamily="34" charset="0"/>
-              </a:rPr>
-              <a:t>- Sistema de Pagamento.</a:t>
-            </a:r>
-          </a:p>
-          <a:p>
-            <a:pPr>
-              <a:lnSpc>
-                <a:spcPct val="115000"/>
-              </a:lnSpc>
-            </a:pPr>
-            <a:endParaRPr lang="pt-BR" sz="2000" b="1" dirty="0">
-              <a:effectLst/>
-              <a:latin typeface="Century Gothic" panose="020B0502020202020204" pitchFamily="34" charset="0"/>
-              <a:ea typeface="Arial" panose="020B0604020202020204" pitchFamily="34" charset="0"/>
-            </a:endParaRPr>
-          </a:p>
-          <a:p>
-            <a:pPr>
-              <a:lnSpc>
-                <a:spcPct val="115000"/>
-              </a:lnSpc>
-            </a:pPr>
-            <a:r>
-              <a:rPr lang="pt-BR" sz="2000" b="1" dirty="0">
-                <a:effectLst/>
-                <a:latin typeface="Century Gothic" panose="020B0502020202020204" pitchFamily="34" charset="0"/>
-                <a:ea typeface="Arial" panose="020B0604020202020204" pitchFamily="34" charset="0"/>
-              </a:rPr>
-              <a:t>Polimento.</a:t>
-            </a:r>
-            <a:endParaRPr lang="pt-BR" sz="2000" dirty="0">
-              <a:effectLst/>
-              <a:latin typeface="Century Gothic" panose="020B0502020202020204" pitchFamily="34" charset="0"/>
-              <a:ea typeface="Arial" panose="020B0604020202020204" pitchFamily="34" charset="0"/>
-            </a:endParaRPr>
-          </a:p>
-          <a:p>
-            <a:pPr>
-              <a:lnSpc>
-                <a:spcPct val="115000"/>
-              </a:lnSpc>
-            </a:pPr>
-            <a:r>
-              <a:rPr lang="pt-BR" sz="2000" dirty="0">
-                <a:effectLst/>
-                <a:latin typeface="Century Gothic" panose="020B0502020202020204" pitchFamily="34" charset="0"/>
-                <a:ea typeface="Arial" panose="020B0604020202020204" pitchFamily="34" charset="0"/>
-              </a:rPr>
-              <a:t>- Otimização de código;</a:t>
-            </a:r>
-          </a:p>
-          <a:p>
-            <a:pPr>
-              <a:lnSpc>
-                <a:spcPct val="115000"/>
-              </a:lnSpc>
-            </a:pPr>
-            <a:r>
-              <a:rPr lang="pt-BR" sz="2000" dirty="0">
-                <a:effectLst/>
-                <a:latin typeface="Century Gothic" panose="020B0502020202020204" pitchFamily="34" charset="0"/>
-                <a:ea typeface="Arial" panose="020B0604020202020204" pitchFamily="34" charset="0"/>
-              </a:rPr>
-              <a:t>- Aprofundamento na interface gráfica;</a:t>
-            </a:r>
-          </a:p>
-          <a:p>
-            <a:pPr>
-              <a:lnSpc>
-                <a:spcPct val="115000"/>
-              </a:lnSpc>
-            </a:pPr>
-            <a:r>
-              <a:rPr lang="pt-BR" sz="2000" dirty="0">
-                <a:effectLst/>
-                <a:latin typeface="Century Gothic" panose="020B0502020202020204" pitchFamily="34" charset="0"/>
-                <a:ea typeface="Arial" panose="020B0604020202020204" pitchFamily="34" charset="0"/>
-              </a:rPr>
-              <a:t>- Melhora na manutenção do código.</a:t>
-            </a:r>
           </a:p>
         </p:txBody>
       </p:sp>
@@ -5071,25 +4849,9 @@
   <p:clrMapOvr>
     <a:masterClrMapping/>
   </p:clrMapOvr>
-  <mc:AlternateContent xmlns:mc="http://schemas.openxmlformats.org/markup-compatibility/2006" xmlns:p14="http://schemas.microsoft.com/office/powerpoint/2010/main">
-    <mc:Choice Requires="p14">
-      <p:transition spd="slow" p14:dur="1500">
-        <p:cover dir="d"/>
-      </p:transition>
-    </mc:Choice>
-    <mc:Fallback xmlns="">
-      <p:transition spd="slow">
-        <p:cover dir="d"/>
-      </p:transition>
-    </mc:Fallback>
-  </mc:AlternateContent>
-  <p:timing>
-    <p:tnLst>
-      <p:par>
-        <p:cTn id="1" dur="indefinite" restart="never" nodeType="tmRoot"/>
-      </p:par>
-    </p:tnLst>
-  </p:timing>
+  <p:transition spd="slow">
+    <p:cover dir="d"/>
+  </p:transition>
 </p:sld>
 </file>
 
@@ -5164,19 +4926,19 @@
         </p:nvSpPr>
         <p:spPr>
           <a:xfrm>
-            <a:off x="3470449" y="927155"/>
+            <a:off x="3470449" y="1086643"/>
             <a:ext cx="5251101" cy="665509"/>
           </a:xfrm>
         </p:spPr>
         <p:txBody>
           <a:bodyPr>
-            <a:normAutofit/>
+            <a:noAutofit/>
           </a:bodyPr>
           <a:lstStyle/>
           <a:p>
             <a:r>
-              <a:rPr lang="pt-BR" sz="4000" b="1" dirty="0">
-                <a:latin typeface="Century Gothic" panose="020B0502020202020204" pitchFamily="34" charset="0"/>
+              <a:rPr lang="pt-BR" sz="4800" b="1" dirty="0">
+                <a:latin typeface="Century Gothic"/>
               </a:rPr>
               <a:t>Agradecimentos</a:t>
             </a:r>
@@ -5199,7 +4961,7 @@
         </p:nvSpPr>
         <p:spPr>
           <a:xfrm>
-            <a:off x="3552363" y="3370029"/>
+            <a:off x="3552363" y="2572587"/>
             <a:ext cx="5087272" cy="1710606"/>
           </a:xfrm>
           <a:prstGeom prst="rect">
@@ -5207,8 +4969,8 @@
           </a:prstGeom>
         </p:spPr>
         <p:txBody>
-          <a:bodyPr vert="horz" lIns="91440" tIns="45720" rIns="91440" bIns="45720" rtlCol="0">
-            <a:normAutofit/>
+          <a:bodyPr vert="horz" lIns="91440" tIns="45720" rIns="91440" bIns="45720" rtlCol="0" anchor="t">
+            <a:noAutofit/>
           </a:bodyPr>
           <a:lstStyle>
             <a:lvl1pPr marL="0" indent="0" algn="ctr" defTabSz="914400" rtl="0" eaLnBrk="1" latinLnBrk="0" hangingPunct="1">
@@ -5381,9 +5143,9 @@
             </a:pPr>
             <a:r>
               <a:rPr lang="pt-BR" dirty="0">
-                <a:latin typeface="Century Gothic" panose="020B0502020202020204" pitchFamily="34" charset="0"/>
+                <a:latin typeface="Century Gothic"/>
               </a:rPr>
-              <a:t>Professores Marcus, Carina  e outros da base técnica.</a:t>
+              <a:t>Professores Marcus, Carina  e outros da base técnica;</a:t>
             </a:r>
           </a:p>
           <a:p>
@@ -5393,9 +5155,9 @@
             </a:pPr>
             <a:r>
               <a:rPr lang="pt-BR" dirty="0">
-                <a:latin typeface="Century Gothic" panose="020B0502020202020204" pitchFamily="34" charset="0"/>
+                <a:latin typeface="Century Gothic"/>
               </a:rPr>
-              <a:t>Familiares que apoiaram.</a:t>
+              <a:t>Amigos e Familiares que apoiaram;</a:t>
             </a:r>
           </a:p>
           <a:p>
@@ -5405,10 +5167,13 @@
             </a:pPr>
             <a:r>
               <a:rPr lang="pt-BR" dirty="0">
-                <a:latin typeface="Century Gothic" panose="020B0502020202020204" pitchFamily="34" charset="0"/>
+                <a:latin typeface="Century Gothic"/>
               </a:rPr>
-              <a:t>Escola</a:t>
-            </a:r>
+              <a:t>Escola e Corpo Docente.</a:t>
+            </a:r>
+            <a:endParaRPr lang="pt-BR" dirty="0">
+              <a:latin typeface="Century Gothic" panose="020B0502020202020204" pitchFamily="34" charset="0"/>
+            </a:endParaRPr>
           </a:p>
         </p:txBody>
       </p:sp>
@@ -5440,7 +5205,7 @@
         </p:blipFill>
         <p:spPr>
           <a:xfrm>
-            <a:off x="5171681" y="233818"/>
+            <a:off x="5171681" y="242678"/>
             <a:ext cx="1848637" cy="665509"/>
           </a:xfrm>
           <a:prstGeom prst="rect">
@@ -5458,25 +5223,9 @@
   <p:clrMapOvr>
     <a:masterClrMapping/>
   </p:clrMapOvr>
-  <mc:AlternateContent xmlns:mc="http://schemas.openxmlformats.org/markup-compatibility/2006" xmlns:p14="http://schemas.microsoft.com/office/powerpoint/2010/main">
-    <mc:Choice Requires="p14">
-      <p:transition spd="slow" p14:dur="1500">
-        <p:cover dir="d"/>
-      </p:transition>
-    </mc:Choice>
-    <mc:Fallback xmlns="">
-      <p:transition spd="slow">
-        <p:cover dir="d"/>
-      </p:transition>
-    </mc:Fallback>
-  </mc:AlternateContent>
-  <p:timing>
-    <p:tnLst>
-      <p:par>
-        <p:cTn id="1" dur="indefinite" restart="never" nodeType="tmRoot"/>
-      </p:par>
-    </p:tnLst>
-  </p:timing>
+  <p:transition spd="slow">
+    <p:cover dir="d"/>
+  </p:transition>
 </p:sld>
 </file>
 
@@ -5562,8 +5311,8 @@
           <a:lstStyle/>
           <a:p>
             <a:r>
-              <a:rPr lang="pt-BR" sz="5400" b="1" dirty="0">
-                <a:latin typeface="Century Gothic" panose="020B0502020202020204" pitchFamily="34" charset="0"/>
+              <a:rPr lang="pt-BR" sz="4800" b="1" dirty="0">
+                <a:latin typeface="Century Gothic"/>
               </a:rPr>
               <a:t>Obrigado pela atenção!</a:t>
             </a:r>
@@ -5616,25 +5365,9 @@
   <p:clrMapOvr>
     <a:masterClrMapping/>
   </p:clrMapOvr>
-  <mc:AlternateContent xmlns:mc="http://schemas.openxmlformats.org/markup-compatibility/2006" xmlns:p14="http://schemas.microsoft.com/office/powerpoint/2010/main">
-    <mc:Choice Requires="p14">
-      <p:transition spd="slow" p14:dur="1500">
-        <p:cover dir="d"/>
-      </p:transition>
-    </mc:Choice>
-    <mc:Fallback xmlns="">
-      <p:transition spd="slow">
-        <p:cover dir="d"/>
-      </p:transition>
-    </mc:Fallback>
-  </mc:AlternateContent>
-  <p:timing>
-    <p:tnLst>
-      <p:par>
-        <p:cTn id="1" dur="indefinite" restart="never" nodeType="tmRoot"/>
-      </p:par>
-    </p:tnLst>
-  </p:timing>
+  <p:transition spd="slow">
+    <p:cover dir="d"/>
+  </p:transition>
 </p:sld>
 </file>
 
@@ -5720,14 +5453,11 @@
           <a:lstStyle/>
           <a:p>
             <a:r>
-              <a:rPr lang="pt-BR" sz="4000" b="1" dirty="0" smtClean="0">
+              <a:rPr lang="pt-BR" sz="4000" b="1" dirty="0">
                 <a:latin typeface="Century Gothic" panose="020B0502020202020204" pitchFamily="34" charset="0"/>
               </a:rPr>
               <a:t>Proposta Inicial</a:t>
             </a:r>
-            <a:endParaRPr lang="pt-BR" sz="4000" b="1" dirty="0">
-              <a:latin typeface="Century Gothic" panose="020B0502020202020204" pitchFamily="34" charset="0"/>
-            </a:endParaRPr>
           </a:p>
         </p:txBody>
       </p:sp>
@@ -5754,12 +5484,12 @@
           </a:xfrm>
         </p:spPr>
         <p:txBody>
-          <a:bodyPr>
+          <a:bodyPr vert="horz" lIns="91440" tIns="45720" rIns="91440" bIns="45720" rtlCol="0" anchor="t">
             <a:normAutofit/>
           </a:bodyPr>
           <a:lstStyle/>
           <a:p>
-            <a:pPr algn="just">
+            <a:pPr algn="l">
               <a:lnSpc>
                 <a:spcPct val="107000"/>
               </a:lnSpc>
@@ -5768,74 +5498,75 @@
               </a:spcAft>
             </a:pPr>
             <a:r>
-              <a:rPr lang="pt-BR" dirty="0" smtClean="0">
+              <a:rPr lang="pt-BR" dirty="0">
                 <a:effectLst/>
-                <a:latin typeface="Century Gothic" panose="020B0502020202020204" pitchFamily="34" charset="0"/>
+                <a:latin typeface="Century Gothic"/>
                 <a:ea typeface="Calibri" panose="020F0502020204030204" pitchFamily="34" charset="0"/>
-                <a:cs typeface="Times New Roman" panose="02020603050405020304" pitchFamily="18" charset="0"/>
+                <a:cs typeface="Times New Roman"/>
               </a:rPr>
               <a:t>Sistema de gerenciamento clínico por meio de </a:t>
             </a:r>
             <a:r>
-              <a:rPr lang="pt-BR" dirty="0" err="1" smtClean="0">
+              <a:rPr lang="pt-BR" dirty="0">
+                <a:latin typeface="Century Gothic"/>
+                <a:ea typeface="Calibri" panose="020F0502020204030204" pitchFamily="34" charset="0"/>
+                <a:cs typeface="Times New Roman"/>
+              </a:rPr>
+              <a:t>um </a:t>
+            </a:r>
+            <a:r>
+              <a:rPr lang="pt-BR" dirty="0" err="1">
                 <a:effectLst/>
-                <a:latin typeface="Century Gothic" panose="020B0502020202020204" pitchFamily="34" charset="0"/>
+                <a:latin typeface="Century Gothic"/>
                 <a:ea typeface="Calibri" panose="020F0502020204030204" pitchFamily="34" charset="0"/>
-                <a:cs typeface="Times New Roman" panose="02020603050405020304" pitchFamily="18" charset="0"/>
+                <a:cs typeface="Times New Roman"/>
               </a:rPr>
               <a:t>bot</a:t>
             </a:r>
             <a:r>
               <a:rPr lang="pt-BR" dirty="0">
-                <a:latin typeface="Century Gothic" panose="020B0502020202020204" pitchFamily="34" charset="0"/>
+                <a:latin typeface="Century Gothic"/>
                 <a:ea typeface="Calibri" panose="020F0502020204030204" pitchFamily="34" charset="0"/>
-                <a:cs typeface="Times New Roman" panose="02020603050405020304" pitchFamily="18" charset="0"/>
+                <a:cs typeface="Times New Roman"/>
               </a:rPr>
-              <a:t> </a:t>
-            </a:r>
-            <a:r>
-              <a:rPr lang="pt-BR" dirty="0" smtClean="0">
-                <a:latin typeface="Century Gothic" panose="020B0502020202020204" pitchFamily="34" charset="0"/>
+              <a:t> hospedado na plataforma de comunicação </a:t>
+            </a:r>
+            <a:r>
+              <a:rPr lang="pt-BR" i="1" dirty="0" err="1">
+                <a:latin typeface="Century Gothic"/>
                 <a:ea typeface="Calibri" panose="020F0502020204030204" pitchFamily="34" charset="0"/>
-                <a:cs typeface="Times New Roman" panose="02020603050405020304" pitchFamily="18" charset="0"/>
-              </a:rPr>
-              <a:t>hospedado na plataforma de comunicação </a:t>
-            </a:r>
-            <a:r>
-              <a:rPr lang="pt-BR" i="1" dirty="0" err="1" smtClean="0">
-                <a:latin typeface="Century Gothic" panose="020B0502020202020204" pitchFamily="34" charset="0"/>
-                <a:ea typeface="Calibri" panose="020F0502020204030204" pitchFamily="34" charset="0"/>
-                <a:cs typeface="Times New Roman" panose="02020603050405020304" pitchFamily="18" charset="0"/>
+                <a:cs typeface="Times New Roman"/>
               </a:rPr>
               <a:t>Telegram</a:t>
             </a:r>
             <a:r>
-              <a:rPr lang="pt-BR" i="1" dirty="0" smtClean="0">
-                <a:latin typeface="Century Gothic" panose="020B0502020202020204" pitchFamily="34" charset="0"/>
+              <a:rPr lang="pt-BR" i="1" dirty="0">
+                <a:latin typeface="Century Gothic"/>
                 <a:ea typeface="Calibri" panose="020F0502020204030204" pitchFamily="34" charset="0"/>
-                <a:cs typeface="Times New Roman" panose="02020603050405020304" pitchFamily="18" charset="0"/>
+                <a:cs typeface="Times New Roman"/>
               </a:rPr>
               <a:t>, </a:t>
             </a:r>
             <a:r>
-              <a:rPr lang="pt-BR" dirty="0" smtClean="0">
-                <a:latin typeface="Century Gothic" panose="020B0502020202020204" pitchFamily="34" charset="0"/>
+              <a:rPr lang="pt-BR" dirty="0">
+                <a:latin typeface="Century Gothic"/>
                 <a:ea typeface="Calibri" panose="020F0502020204030204" pitchFamily="34" charset="0"/>
-                <a:cs typeface="Times New Roman" panose="02020603050405020304" pitchFamily="18" charset="0"/>
+                <a:cs typeface="Times New Roman"/>
               </a:rPr>
               <a:t>escrito em Java, destinado á empresa </a:t>
             </a:r>
             <a:r>
-              <a:rPr lang="pt-BR" b="1" i="1" dirty="0" smtClean="0">
-                <a:latin typeface="Century Gothic" panose="020B0502020202020204" pitchFamily="34" charset="0"/>
+              <a:rPr lang="pt-BR" b="1" i="1" dirty="0">
+                <a:latin typeface="Century Gothic"/>
                 <a:ea typeface="Calibri" panose="020F0502020204030204" pitchFamily="34" charset="0"/>
-                <a:cs typeface="Times New Roman" panose="02020603050405020304" pitchFamily="18" charset="0"/>
+                <a:cs typeface="Times New Roman"/>
               </a:rPr>
               <a:t>Health++.</a:t>
             </a:r>
-          </a:p>
-          <a:p>
-            <a:pPr algn="just">
+            <a:endParaRPr lang="pt-BR"/>
+          </a:p>
+          <a:p>
+            <a:pPr algn="l">
               <a:lnSpc>
                 <a:spcPct val="107000"/>
               </a:lnSpc>
@@ -5844,18 +5575,18 @@
               </a:spcAft>
             </a:pPr>
             <a:r>
-              <a:rPr lang="pt-BR" dirty="0" smtClean="0">
-                <a:latin typeface="Century Gothic" panose="020B0502020202020204" pitchFamily="34" charset="0"/>
+              <a:rPr lang="pt-BR" dirty="0">
+                <a:latin typeface="Century Gothic"/>
                 <a:ea typeface="Calibri" panose="020F0502020204030204" pitchFamily="34" charset="0"/>
-                <a:cs typeface="Times New Roman" panose="02020603050405020304" pitchFamily="18" charset="0"/>
+                <a:cs typeface="Times New Roman"/>
               </a:rPr>
-              <a:t>O cliente, por meio de uma conversa dinâmica, poderia se conectar com a clínica realizando cadastro, realizando agendamentos, etc. de forma remota.</a:t>
+              <a:t>O cliente, por meio de uma conversa dinâmica, poderia se conectar com a clínica realizando cadastro, agendamentos, entre outros, de forma remota.</a:t>
             </a:r>
             <a:endParaRPr lang="pt-BR" dirty="0">
               <a:effectLst/>
-              <a:latin typeface="Century Gothic" panose="020B0502020202020204" pitchFamily="34" charset="0"/>
+              <a:latin typeface="Century Gothic"/>
               <a:ea typeface="Calibri" panose="020F0502020204030204" pitchFamily="34" charset="0"/>
-              <a:cs typeface="Times New Roman" panose="02020603050405020304" pitchFamily="18" charset="0"/>
+              <a:cs typeface="Times New Roman"/>
             </a:endParaRPr>
           </a:p>
         </p:txBody>
@@ -5906,25 +5637,9 @@
   <p:clrMapOvr>
     <a:masterClrMapping/>
   </p:clrMapOvr>
-  <mc:AlternateContent xmlns:mc="http://schemas.openxmlformats.org/markup-compatibility/2006" xmlns:p14="http://schemas.microsoft.com/office/powerpoint/2010/main">
-    <mc:Choice Requires="p14">
-      <p:transition spd="slow" p14:dur="1500">
-        <p:cover dir="d"/>
-      </p:transition>
-    </mc:Choice>
-    <mc:Fallback xmlns="">
-      <p:transition spd="slow">
-        <p:cover dir="d"/>
-      </p:transition>
-    </mc:Fallback>
-  </mc:AlternateContent>
-  <p:timing>
-    <p:tnLst>
-      <p:par>
-        <p:cTn id="1" dur="indefinite" restart="never" nodeType="tmRoot"/>
-      </p:par>
-    </p:tnLst>
-  </p:timing>
+  <p:transition spd="slow">
+    <p:cover dir="d"/>
+  </p:transition>
 </p:sld>
 </file>
 
@@ -6010,14 +5725,11 @@
           <a:lstStyle/>
           <a:p>
             <a:r>
-              <a:rPr lang="pt-BR" sz="4000" b="1" dirty="0" smtClean="0">
+              <a:rPr lang="pt-BR" sz="4000" b="1" dirty="0">
                 <a:latin typeface="Century Gothic" panose="020B0502020202020204" pitchFamily="34" charset="0"/>
               </a:rPr>
               <a:t>Proposta Definitiva</a:t>
             </a:r>
-            <a:endParaRPr lang="pt-BR" sz="4000" b="1" dirty="0">
-              <a:latin typeface="Century Gothic" panose="020B0502020202020204" pitchFamily="34" charset="0"/>
-            </a:endParaRPr>
           </a:p>
         </p:txBody>
       </p:sp>
@@ -6058,56 +5770,14 @@
               </a:spcAft>
             </a:pPr>
             <a:r>
-              <a:rPr lang="pt-BR" dirty="0" smtClean="0">
-                <a:effectLst/>
-                <a:latin typeface="Century Gothic" panose="020B0502020202020204" pitchFamily="34" charset="0"/>
-                <a:ea typeface="Calibri" panose="020F0502020204030204" pitchFamily="34" charset="0"/>
-                <a:cs typeface="Times New Roman" panose="02020603050405020304" pitchFamily="18" charset="0"/>
-              </a:rPr>
-              <a:t>Devido as complicações com a ideia inicial, o </a:t>
-            </a:r>
-            <a:r>
               <a:rPr lang="pt-BR" dirty="0">
                 <a:effectLst/>
                 <a:latin typeface="Century Gothic" panose="020B0502020202020204" pitchFamily="34" charset="0"/>
                 <a:ea typeface="Calibri" panose="020F0502020204030204" pitchFamily="34" charset="0"/>
                 <a:cs typeface="Times New Roman" panose="02020603050405020304" pitchFamily="18" charset="0"/>
               </a:rPr>
-              <a:t>projeto </a:t>
-            </a:r>
-            <a:r>
-              <a:rPr lang="pt-BR" dirty="0" smtClean="0">
-                <a:effectLst/>
-                <a:latin typeface="Century Gothic" panose="020B0502020202020204" pitchFamily="34" charset="0"/>
-                <a:ea typeface="Calibri" panose="020F0502020204030204" pitchFamily="34" charset="0"/>
-                <a:cs typeface="Times New Roman" panose="02020603050405020304" pitchFamily="18" charset="0"/>
-              </a:rPr>
-              <a:t>foi remodelado para </a:t>
-            </a:r>
-            <a:r>
-              <a:rPr lang="pt-BR" dirty="0">
-                <a:effectLst/>
-                <a:latin typeface="Century Gothic" panose="020B0502020202020204" pitchFamily="34" charset="0"/>
-                <a:ea typeface="Calibri" panose="020F0502020204030204" pitchFamily="34" charset="0"/>
-                <a:cs typeface="Times New Roman" panose="02020603050405020304" pitchFamily="18" charset="0"/>
-              </a:rPr>
-              <a:t>uma </a:t>
-            </a:r>
-            <a:r>
-              <a:rPr lang="pt-BR" dirty="0" smtClean="0">
-                <a:effectLst/>
-                <a:latin typeface="Century Gothic" panose="020B0502020202020204" pitchFamily="34" charset="0"/>
-                <a:ea typeface="Calibri" panose="020F0502020204030204" pitchFamily="34" charset="0"/>
-                <a:cs typeface="Times New Roman" panose="02020603050405020304" pitchFamily="18" charset="0"/>
-              </a:rPr>
-              <a:t>aplicação para computadores e notebooks, a qual realizaria as mesmas funções de forma fixa e com a adição de uma área administrativa.</a:t>
-            </a:r>
-            <a:endParaRPr lang="pt-BR" dirty="0">
-              <a:effectLst/>
-              <a:latin typeface="Century Gothic" panose="020B0502020202020204" pitchFamily="34" charset="0"/>
-              <a:ea typeface="Calibri" panose="020F0502020204030204" pitchFamily="34" charset="0"/>
-              <a:cs typeface="Times New Roman" panose="02020603050405020304" pitchFamily="18" charset="0"/>
-            </a:endParaRPr>
+              <a:t>Devido as complicações com a ideia inicial, o projeto foi remodelado para uma aplicação para computadores e notebooks, a qual realizaria as mesmas funções de forma fixa e com a adição de uma área administrativa.</a:t>
+            </a:r>
           </a:p>
         </p:txBody>
       </p:sp>
@@ -6157,25 +5827,9 @@
   <p:clrMapOvr>
     <a:masterClrMapping/>
   </p:clrMapOvr>
-  <mc:AlternateContent xmlns:mc="http://schemas.openxmlformats.org/markup-compatibility/2006" xmlns:p14="http://schemas.microsoft.com/office/powerpoint/2010/main">
-    <mc:Choice Requires="p14">
-      <p:transition spd="slow" p14:dur="1500">
-        <p:cover dir="d"/>
-      </p:transition>
-    </mc:Choice>
-    <mc:Fallback xmlns="">
-      <p:transition spd="slow">
-        <p:cover dir="d"/>
-      </p:transition>
-    </mc:Fallback>
-  </mc:AlternateContent>
-  <p:timing>
-    <p:tnLst>
-      <p:par>
-        <p:cTn id="1" dur="indefinite" restart="never" nodeType="tmRoot"/>
-      </p:par>
-    </p:tnLst>
-  </p:timing>
+  <p:transition spd="slow">
+    <p:cover dir="d"/>
+  </p:transition>
 </p:sld>
 </file>
 
@@ -6261,14 +5915,11 @@
           <a:lstStyle/>
           <a:p>
             <a:r>
-              <a:rPr lang="pt-BR" sz="4000" b="1" dirty="0" smtClean="0">
+              <a:rPr lang="pt-BR" sz="4000" b="1" dirty="0">
                 <a:latin typeface="Century Gothic" panose="020B0502020202020204" pitchFamily="34" charset="0"/>
               </a:rPr>
               <a:t>Ferramentas Usadas</a:t>
             </a:r>
-            <a:endParaRPr lang="pt-BR" sz="4000" b="1" dirty="0">
-              <a:latin typeface="Century Gothic" panose="020B0502020202020204" pitchFamily="34" charset="0"/>
-            </a:endParaRPr>
           </a:p>
         </p:txBody>
       </p:sp>
@@ -6311,7 +5962,7 @@
               <a:buChar char="•"/>
             </a:pPr>
             <a:r>
-              <a:rPr lang="pt-BR" sz="2800" dirty="0" smtClean="0">
+              <a:rPr lang="pt-BR" sz="2800" dirty="0">
                 <a:latin typeface="Century Gothic" panose="020B0502020202020204" pitchFamily="34" charset="0"/>
                 <a:ea typeface="Calibri" panose="020F0502020204030204" pitchFamily="34" charset="0"/>
                 <a:cs typeface="Times New Roman" panose="02020603050405020304" pitchFamily="18" charset="0"/>
@@ -6331,22 +5982,13 @@
               <a:buChar char="•"/>
             </a:pPr>
             <a:r>
-              <a:rPr lang="pt-BR" sz="2800" dirty="0" err="1" smtClean="0">
+              <a:rPr lang="pt-BR" sz="2800" dirty="0">
                 <a:effectLst/>
                 <a:latin typeface="Century Gothic" panose="020B0502020202020204" pitchFamily="34" charset="0"/>
                 <a:ea typeface="Calibri" panose="020F0502020204030204" pitchFamily="34" charset="0"/>
                 <a:cs typeface="Times New Roman" panose="02020603050405020304" pitchFamily="18" charset="0"/>
               </a:rPr>
-              <a:t>Netbeans</a:t>
-            </a:r>
-            <a:r>
-              <a:rPr lang="pt-BR" sz="2800" dirty="0" smtClean="0">
-                <a:effectLst/>
-                <a:latin typeface="Century Gothic" panose="020B0502020202020204" pitchFamily="34" charset="0"/>
-                <a:ea typeface="Calibri" panose="020F0502020204030204" pitchFamily="34" charset="0"/>
-                <a:cs typeface="Times New Roman" panose="02020603050405020304" pitchFamily="18" charset="0"/>
-              </a:rPr>
-              <a:t>;</a:t>
+              <a:t>Netbeans;</a:t>
             </a:r>
           </a:p>
           <a:p>
@@ -6361,36 +6003,12 @@
               <a:buChar char="•"/>
             </a:pPr>
             <a:r>
-              <a:rPr lang="pt-BR" sz="2800" dirty="0" err="1" smtClean="0">
+              <a:rPr lang="pt-BR" sz="2800" dirty="0">
                 <a:latin typeface="Century Gothic" panose="020B0502020202020204" pitchFamily="34" charset="0"/>
                 <a:ea typeface="Calibri" panose="020F0502020204030204" pitchFamily="34" charset="0"/>
                 <a:cs typeface="Times New Roman" panose="02020603050405020304" pitchFamily="18" charset="0"/>
               </a:rPr>
-              <a:t>Git</a:t>
-            </a:r>
-            <a:r>
-              <a:rPr lang="pt-BR" sz="2800" dirty="0" smtClean="0">
-                <a:latin typeface="Century Gothic" panose="020B0502020202020204" pitchFamily="34" charset="0"/>
-                <a:ea typeface="Calibri" panose="020F0502020204030204" pitchFamily="34" charset="0"/>
-                <a:cs typeface="Times New Roman" panose="02020603050405020304" pitchFamily="18" charset="0"/>
-              </a:rPr>
-              <a:t> e </a:t>
-            </a:r>
-            <a:r>
-              <a:rPr lang="pt-BR" sz="2800" dirty="0" err="1" smtClean="0">
-                <a:latin typeface="Century Gothic" panose="020B0502020202020204" pitchFamily="34" charset="0"/>
-                <a:ea typeface="Calibri" panose="020F0502020204030204" pitchFamily="34" charset="0"/>
-                <a:cs typeface="Times New Roman" panose="02020603050405020304" pitchFamily="18" charset="0"/>
-              </a:rPr>
-              <a:t>Github</a:t>
-            </a:r>
-            <a:r>
-              <a:rPr lang="pt-BR" sz="2800" dirty="0" smtClean="0">
-                <a:latin typeface="Century Gothic" panose="020B0502020202020204" pitchFamily="34" charset="0"/>
-                <a:ea typeface="Calibri" panose="020F0502020204030204" pitchFamily="34" charset="0"/>
-                <a:cs typeface="Times New Roman" panose="02020603050405020304" pitchFamily="18" charset="0"/>
-              </a:rPr>
-              <a:t>;</a:t>
+              <a:t>Git e Github;</a:t>
             </a:r>
           </a:p>
           <a:p>
@@ -6405,7 +6023,7 @@
               <a:buChar char="•"/>
             </a:pPr>
             <a:r>
-              <a:rPr lang="pt-BR" sz="2800" dirty="0" smtClean="0">
+              <a:rPr lang="pt-BR" sz="2800" dirty="0">
                 <a:effectLst/>
                 <a:latin typeface="Century Gothic" panose="020B0502020202020204" pitchFamily="34" charset="0"/>
                 <a:ea typeface="Calibri" panose="020F0502020204030204" pitchFamily="34" charset="0"/>
@@ -6413,12 +6031,6 @@
               </a:rPr>
               <a:t>Google Docs.</a:t>
             </a:r>
-            <a:endParaRPr lang="pt-BR" sz="2800" dirty="0">
-              <a:effectLst/>
-              <a:latin typeface="Century Gothic" panose="020B0502020202020204" pitchFamily="34" charset="0"/>
-              <a:ea typeface="Calibri" panose="020F0502020204030204" pitchFamily="34" charset="0"/>
-              <a:cs typeface="Times New Roman" panose="02020603050405020304" pitchFamily="18" charset="0"/>
-            </a:endParaRPr>
           </a:p>
         </p:txBody>
       </p:sp>
@@ -6456,6 +6068,170 @@
           <a:prstGeom prst="rect">
             <a:avLst/>
           </a:prstGeom>
+        </p:spPr>
+      </p:pic>
+      <p:pic>
+        <p:nvPicPr>
+          <p:cNvPr id="1026" name="Picture 2" descr="Java Logo PNG Transparent (1) – Brands Logos"/>
+          <p:cNvPicPr>
+            <a:picLocks noChangeAspect="1" noChangeArrowheads="1"/>
+          </p:cNvPicPr>
+          <p:nvPr/>
+        </p:nvPicPr>
+        <p:blipFill>
+          <a:blip r:embed="rId4" cstate="hqprint">
+            <a:extLst>
+              <a:ext uri="{28A0092B-C50C-407E-A947-70E740481C1C}">
+                <a14:useLocalDpi xmlns:a14="http://schemas.microsoft.com/office/drawing/2010/main" val="0"/>
+              </a:ext>
+            </a:extLst>
+          </a:blip>
+          <a:srcRect/>
+          <a:stretch>
+            <a:fillRect/>
+          </a:stretch>
+        </p:blipFill>
+        <p:spPr bwMode="auto">
+          <a:xfrm>
+            <a:off x="5200608" y="1685365"/>
+            <a:ext cx="2148835" cy="2148835"/>
+          </a:xfrm>
+          <a:prstGeom prst="rect">
+            <a:avLst/>
+          </a:prstGeom>
+          <a:noFill/>
+          <a:extLst>
+            <a:ext uri="{909E8E84-426E-40DD-AFC4-6F175D3DCCD1}">
+              <a14:hiddenFill xmlns:a14="http://schemas.microsoft.com/office/drawing/2010/main">
+                <a:solidFill>
+                  <a:srgbClr val="FFFFFF"/>
+                </a:solidFill>
+              </a14:hiddenFill>
+            </a:ext>
+          </a:extLst>
+        </p:spPr>
+      </p:pic>
+      <p:pic>
+        <p:nvPicPr>
+          <p:cNvPr id="1032" name="Picture 8" descr="Download NetBeans Logo in SVG Vector or PNG File Format - Logo.wine"/>
+          <p:cNvPicPr>
+            <a:picLocks noChangeAspect="1" noChangeArrowheads="1"/>
+          </p:cNvPicPr>
+          <p:nvPr/>
+        </p:nvPicPr>
+        <p:blipFill>
+          <a:blip r:embed="rId5" cstate="hqprint">
+            <a:extLst>
+              <a:ext uri="{28A0092B-C50C-407E-A947-70E740481C1C}">
+                <a14:useLocalDpi xmlns:a14="http://schemas.microsoft.com/office/drawing/2010/main" val="0"/>
+              </a:ext>
+            </a:extLst>
+          </a:blip>
+          <a:srcRect/>
+          <a:stretch>
+            <a:fillRect/>
+          </a:stretch>
+        </p:blipFill>
+        <p:spPr bwMode="auto">
+          <a:xfrm>
+            <a:off x="7612574" y="1805457"/>
+            <a:ext cx="3807648" cy="2538432"/>
+          </a:xfrm>
+          <a:prstGeom prst="rect">
+            <a:avLst/>
+          </a:prstGeom>
+          <a:noFill/>
+          <a:extLst>
+            <a:ext uri="{909E8E84-426E-40DD-AFC4-6F175D3DCCD1}">
+              <a14:hiddenFill xmlns:a14="http://schemas.microsoft.com/office/drawing/2010/main">
+                <a:solidFill>
+                  <a:srgbClr val="FFFFFF"/>
+                </a:solidFill>
+              </a14:hiddenFill>
+            </a:ext>
+          </a:extLst>
+        </p:spPr>
+      </p:pic>
+      <p:pic>
+        <p:nvPicPr>
+          <p:cNvPr id="1034" name="Picture 10" descr="GitHub Logo, symbol, meaning, history, PNG, brand"/>
+          <p:cNvPicPr>
+            <a:picLocks noChangeAspect="1" noChangeArrowheads="1"/>
+          </p:cNvPicPr>
+          <p:nvPr/>
+        </p:nvPicPr>
+        <p:blipFill>
+          <a:blip r:embed="rId6" cstate="hqprint">
+            <a:extLst>
+              <a:ext uri="{28A0092B-C50C-407E-A947-70E740481C1C}">
+                <a14:useLocalDpi xmlns:a14="http://schemas.microsoft.com/office/drawing/2010/main" val="0"/>
+              </a:ext>
+            </a:extLst>
+          </a:blip>
+          <a:srcRect/>
+          <a:stretch>
+            <a:fillRect/>
+          </a:stretch>
+        </p:blipFill>
+        <p:spPr bwMode="auto">
+          <a:xfrm>
+            <a:off x="7631909" y="4343889"/>
+            <a:ext cx="3412202" cy="1919364"/>
+          </a:xfrm>
+          <a:prstGeom prst="rect">
+            <a:avLst/>
+          </a:prstGeom>
+          <a:noFill/>
+          <a:extLst>
+            <a:ext uri="{909E8E84-426E-40DD-AFC4-6F175D3DCCD1}">
+              <a14:hiddenFill xmlns:a14="http://schemas.microsoft.com/office/drawing/2010/main">
+                <a:solidFill>
+                  <a:srgbClr val="FFFFFF"/>
+                </a:solidFill>
+              </a14:hiddenFill>
+            </a:ext>
+          </a:extLst>
+        </p:spPr>
+      </p:pic>
+      <p:pic>
+        <p:nvPicPr>
+          <p:cNvPr id="1036" name="Picture 12" descr="Google Docs Logo transparent PNG - StickPNG"/>
+          <p:cNvPicPr>
+            <a:picLocks noChangeAspect="1" noChangeArrowheads="1"/>
+          </p:cNvPicPr>
+          <p:nvPr/>
+        </p:nvPicPr>
+        <p:blipFill>
+          <a:blip r:embed="rId7" cstate="hqprint">
+            <a:extLst>
+              <a:ext uri="{28A0092B-C50C-407E-A947-70E740481C1C}">
+                <a14:useLocalDpi xmlns:a14="http://schemas.microsoft.com/office/drawing/2010/main" val="0"/>
+              </a:ext>
+            </a:extLst>
+          </a:blip>
+          <a:srcRect/>
+          <a:stretch>
+            <a:fillRect/>
+          </a:stretch>
+        </p:blipFill>
+        <p:spPr bwMode="auto">
+          <a:xfrm>
+            <a:off x="5485044" y="4225332"/>
+            <a:ext cx="1579961" cy="1579961"/>
+          </a:xfrm>
+          <a:prstGeom prst="rect">
+            <a:avLst/>
+          </a:prstGeom>
+          <a:noFill/>
+          <a:extLst>
+            <a:ext uri="{909E8E84-426E-40DD-AFC4-6F175D3DCCD1}">
+              <a14:hiddenFill xmlns:a14="http://schemas.microsoft.com/office/drawing/2010/main">
+                <a:solidFill>
+                  <a:srgbClr val="FFFFFF"/>
+                </a:solidFill>
+              </a14:hiddenFill>
+            </a:ext>
+          </a:extLst>
         </p:spPr>
       </p:pic>
     </p:spTree>
@@ -6468,25 +6244,9 @@
   <p:clrMapOvr>
     <a:masterClrMapping/>
   </p:clrMapOvr>
-  <mc:AlternateContent xmlns:mc="http://schemas.openxmlformats.org/markup-compatibility/2006" xmlns:p14="http://schemas.microsoft.com/office/powerpoint/2010/main">
-    <mc:Choice Requires="p14">
-      <p:transition spd="slow" p14:dur="1500">
-        <p:cover dir="d"/>
-      </p:transition>
-    </mc:Choice>
-    <mc:Fallback xmlns="">
-      <p:transition spd="slow">
-        <p:cover dir="d"/>
-      </p:transition>
-    </mc:Fallback>
-  </mc:AlternateContent>
-  <p:timing>
-    <p:tnLst>
-      <p:par>
-        <p:cTn id="1" dur="indefinite" restart="never" nodeType="tmRoot"/>
-      </p:par>
-    </p:tnLst>
-  </p:timing>
+  <p:transition spd="slow">
+    <p:cover dir="d"/>
+  </p:transition>
 </p:sld>
 </file>
 
@@ -6640,7 +6400,7 @@
           </a:prstGeom>
         </p:spPr>
         <p:txBody>
-          <a:bodyPr vert="horz" lIns="91440" tIns="45720" rIns="91440" bIns="45720" rtlCol="0">
+          <a:bodyPr vert="horz" lIns="91440" tIns="45720" rIns="91440" bIns="45720" rtlCol="0" anchor="t">
             <a:noAutofit/>
           </a:bodyPr>
           <a:lstStyle>
@@ -6815,11 +6575,33 @@
             </a:pPr>
             <a:r>
               <a:rPr lang="pt-BR" dirty="0">
-                <a:effectLst/>
-                <a:latin typeface="Century Gothic" panose="020B0502020202020204" pitchFamily="34" charset="0"/>
+                <a:latin typeface="Century Gothic"/>
                 <a:ea typeface="Arial" panose="020B0604020202020204" pitchFamily="34" charset="0"/>
               </a:rPr>
-              <a:t>A Política de Segurança é baseada em dois níveis de acesso:</a:t>
+              <a:t>O Controle de</a:t>
+            </a:r>
+            <a:r>
+              <a:rPr lang="pt-BR" dirty="0">
+                <a:effectLst/>
+                <a:latin typeface="Century Gothic"/>
+                <a:ea typeface="Arial" panose="020B0604020202020204" pitchFamily="34" charset="0"/>
+              </a:rPr>
+              <a:t> Segurança é </a:t>
+            </a:r>
+            <a:r>
+              <a:rPr lang="pt-BR" dirty="0">
+                <a:latin typeface="Century Gothic"/>
+                <a:ea typeface="Arial" panose="020B0604020202020204" pitchFamily="34" charset="0"/>
+              </a:rPr>
+              <a:t>baseado</a:t>
+            </a:r>
+            <a:r>
+              <a:rPr lang="pt-BR" dirty="0">
+                <a:effectLst/>
+                <a:latin typeface="Century Gothic"/>
+                <a:ea typeface="Arial" panose="020B0604020202020204" pitchFamily="34" charset="0"/>
+              </a:rPr>
+              <a:t> em dois níveis de acesso:</a:t>
             </a:r>
           </a:p>
           <a:p>
@@ -6853,11 +6635,38 @@
             <a:r>
               <a:rPr lang="pt-BR" sz="2000" dirty="0">
                 <a:effectLst/>
-                <a:latin typeface="Century Gothic" panose="020B0502020202020204" pitchFamily="34" charset="0"/>
+                <a:latin typeface="Century Gothic"/>
                 <a:ea typeface="Arial" panose="020B0604020202020204" pitchFamily="34" charset="0"/>
               </a:rPr>
-              <a:t>Tem acesso as funcionalidades básicas do sistema </a:t>
-            </a:r>
+              <a:t>Tem acesso </a:t>
+            </a:r>
+            <a:r>
+              <a:rPr lang="pt-BR" sz="2000" dirty="0">
+                <a:latin typeface="Century Gothic"/>
+                <a:ea typeface="Arial" panose="020B0604020202020204" pitchFamily="34" charset="0"/>
+              </a:rPr>
+              <a:t>às </a:t>
+            </a:r>
+            <a:r>
+              <a:rPr lang="pt-BR" sz="2000" dirty="0">
+                <a:effectLst/>
+                <a:latin typeface="Century Gothic"/>
+                <a:ea typeface="Arial" panose="020B0604020202020204" pitchFamily="34" charset="0"/>
+              </a:rPr>
+              <a:t>funcionalidades básicas do sistema</a:t>
+            </a:r>
+            <a:r>
+              <a:rPr lang="pt-BR" sz="2000" dirty="0">
+                <a:latin typeface="Century Gothic"/>
+                <a:ea typeface="Arial" panose="020B0604020202020204" pitchFamily="34" charset="0"/>
+              </a:rPr>
+              <a:t> </a:t>
+            </a:r>
+            <a:endParaRPr lang="pt-BR" sz="2000" dirty="0">
+              <a:effectLst/>
+              <a:latin typeface="Century Gothic" panose="020B0502020202020204" pitchFamily="34" charset="0"/>
+              <a:ea typeface="Arial" panose="020B0604020202020204" pitchFamily="34" charset="0"/>
+            </a:endParaRPr>
           </a:p>
           <a:p>
             <a:pPr>
@@ -6920,11 +6729,38 @@
             <a:r>
               <a:rPr lang="pt-BR" sz="2000" dirty="0">
                 <a:effectLst/>
-                <a:latin typeface="Century Gothic" panose="020B0502020202020204" pitchFamily="34" charset="0"/>
+                <a:latin typeface="Century Gothic"/>
                 <a:ea typeface="Arial" panose="020B0604020202020204" pitchFamily="34" charset="0"/>
               </a:rPr>
-              <a:t>Tem acesso as funcionalidades básicas e as avançadas </a:t>
-            </a:r>
+              <a:t>Tem acesso </a:t>
+            </a:r>
+            <a:r>
+              <a:rPr lang="pt-BR" sz="2000" dirty="0">
+                <a:latin typeface="Century Gothic"/>
+                <a:ea typeface="Arial" panose="020B0604020202020204" pitchFamily="34" charset="0"/>
+              </a:rPr>
+              <a:t>às </a:t>
+            </a:r>
+            <a:r>
+              <a:rPr lang="pt-BR" sz="2000" dirty="0">
+                <a:effectLst/>
+                <a:latin typeface="Century Gothic"/>
+                <a:ea typeface="Arial" panose="020B0604020202020204" pitchFamily="34" charset="0"/>
+              </a:rPr>
+              <a:t>funcionalidades básicas e as avançadas</a:t>
+            </a:r>
+            <a:r>
+              <a:rPr lang="pt-BR" sz="2000" dirty="0">
+                <a:latin typeface="Century Gothic"/>
+                <a:ea typeface="Arial" panose="020B0604020202020204" pitchFamily="34" charset="0"/>
+              </a:rPr>
+              <a:t> </a:t>
+            </a:r>
+            <a:endParaRPr lang="pt-BR" sz="2000" dirty="0">
+              <a:effectLst/>
+              <a:latin typeface="Century Gothic" panose="020B0502020202020204" pitchFamily="34" charset="0"/>
+              <a:ea typeface="Arial" panose="020B0604020202020204" pitchFamily="34" charset="0"/>
+            </a:endParaRPr>
           </a:p>
           <a:p>
             <a:pPr>
@@ -6965,25 +6801,9 @@
   <p:clrMapOvr>
     <a:masterClrMapping/>
   </p:clrMapOvr>
-  <mc:AlternateContent xmlns:mc="http://schemas.openxmlformats.org/markup-compatibility/2006" xmlns:p14="http://schemas.microsoft.com/office/powerpoint/2010/main">
-    <mc:Choice Requires="p14">
-      <p:transition spd="slow" p14:dur="1500">
-        <p:cover dir="d"/>
-      </p:transition>
-    </mc:Choice>
-    <mc:Fallback xmlns="">
-      <p:transition spd="slow">
-        <p:cover dir="d"/>
-      </p:transition>
-    </mc:Fallback>
-  </mc:AlternateContent>
-  <p:timing>
-    <p:tnLst>
-      <p:par>
-        <p:cTn id="1" dur="indefinite" restart="never" nodeType="tmRoot"/>
-      </p:par>
-    </p:tnLst>
-  </p:timing>
+  <p:transition spd="slow">
+    <p:cover dir="d"/>
+  </p:transition>
 </p:sld>
 </file>
 
@@ -7123,25 +6943,9 @@
   <p:clrMapOvr>
     <a:masterClrMapping/>
   </p:clrMapOvr>
-  <mc:AlternateContent xmlns:mc="http://schemas.openxmlformats.org/markup-compatibility/2006" xmlns:p14="http://schemas.microsoft.com/office/powerpoint/2010/main">
-    <mc:Choice Requires="p14">
-      <p:transition spd="slow" p14:dur="1500">
-        <p:cover dir="d"/>
-      </p:transition>
-    </mc:Choice>
-    <mc:Fallback xmlns="">
-      <p:transition spd="slow">
-        <p:cover dir="d"/>
-      </p:transition>
-    </mc:Fallback>
-  </mc:AlternateContent>
-  <p:timing>
-    <p:tnLst>
-      <p:par>
-        <p:cTn id="1" dur="indefinite" restart="never" nodeType="tmRoot"/>
-      </p:par>
-    </p:tnLst>
-  </p:timing>
+  <p:transition spd="slow">
+    <p:cover dir="d"/>
+  </p:transition>
 </p:sld>
 </file>
 
@@ -7343,15 +7147,9 @@
       </p:sp>
       <p:pic>
         <p:nvPicPr>
-          <p:cNvPr id="6146" name="Picture 2">
-            <a:extLst>
-              <a:ext uri="{FF2B5EF4-FFF2-40B4-BE49-F238E27FC236}">
-                <a16:creationId xmlns:a16="http://schemas.microsoft.com/office/drawing/2014/main" id="{7A99931B-1237-5974-7951-7BE165074B41}"/>
-              </a:ext>
-            </a:extLst>
-          </p:cNvPr>
+          <p:cNvPr id="6" name="Imagem 5"/>
           <p:cNvPicPr>
-            <a:picLocks noChangeAspect="1" noChangeArrowheads="1"/>
+            <a:picLocks noChangeAspect="1"/>
           </p:cNvPicPr>
           <p:nvPr/>
         </p:nvPicPr>
@@ -7363,29 +7161,18 @@
               </a:ext>
             </a:extLst>
           </a:blip>
-          <a:srcRect/>
           <a:stretch>
             <a:fillRect/>
           </a:stretch>
         </p:blipFill>
-        <p:spPr bwMode="auto">
-          <a:xfrm>
-            <a:off x="3034456" y="2043873"/>
-            <a:ext cx="6123085" cy="4263213"/>
+        <p:spPr>
+          <a:xfrm>
+            <a:off x="1877366" y="2010111"/>
+            <a:ext cx="8287630" cy="4631322"/>
           </a:xfrm>
           <a:prstGeom prst="rect">
             <a:avLst/>
           </a:prstGeom>
-          <a:noFill/>
-          <a:extLst>
-            <a:ext uri="{909E8E84-426E-40DD-AFC4-6F175D3DCCD1}">
-              <a14:hiddenFill xmlns:a14="http://schemas.microsoft.com/office/drawing/2010/main">
-                <a:solidFill>
-                  <a:srgbClr val="FFFFFF"/>
-                </a:solidFill>
-              </a14:hiddenFill>
-            </a:ext>
-          </a:extLst>
         </p:spPr>
       </p:pic>
     </p:spTree>
@@ -7398,25 +7185,9 @@
   <p:clrMapOvr>
     <a:masterClrMapping/>
   </p:clrMapOvr>
-  <mc:AlternateContent xmlns:mc="http://schemas.openxmlformats.org/markup-compatibility/2006" xmlns:p14="http://schemas.microsoft.com/office/powerpoint/2010/main">
-    <mc:Choice Requires="p14">
-      <p:transition spd="slow" p14:dur="1500">
-        <p:cover dir="d"/>
-      </p:transition>
-    </mc:Choice>
-    <mc:Fallback xmlns="">
-      <p:transition spd="slow">
-        <p:cover dir="d"/>
-      </p:transition>
-    </mc:Fallback>
-  </mc:AlternateContent>
-  <p:timing>
-    <p:tnLst>
-      <p:par>
-        <p:cTn id="1" dur="indefinite" restart="never" nodeType="tmRoot"/>
-      </p:par>
-    </p:tnLst>
-  </p:timing>
+  <p:transition spd="slow">
+    <p:cover dir="d"/>
+  </p:transition>
 </p:sld>
 </file>
 
@@ -7618,15 +7389,9 @@
       </p:sp>
       <p:pic>
         <p:nvPicPr>
-          <p:cNvPr id="9218" name="Picture 2">
-            <a:extLst>
-              <a:ext uri="{FF2B5EF4-FFF2-40B4-BE49-F238E27FC236}">
-                <a16:creationId xmlns:a16="http://schemas.microsoft.com/office/drawing/2014/main" id="{AB6575E6-D1A3-5654-BDF7-1021BC537A0A}"/>
-              </a:ext>
-            </a:extLst>
-          </p:cNvPr>
+          <p:cNvPr id="6" name="Imagem 5"/>
           <p:cNvPicPr>
-            <a:picLocks noChangeAspect="1" noChangeArrowheads="1"/>
+            <a:picLocks noChangeAspect="1"/>
           </p:cNvPicPr>
           <p:nvPr/>
         </p:nvPicPr>
@@ -7638,29 +7403,18 @@
               </a:ext>
             </a:extLst>
           </a:blip>
-          <a:srcRect/>
           <a:stretch>
             <a:fillRect/>
           </a:stretch>
         </p:blipFill>
-        <p:spPr bwMode="auto">
-          <a:xfrm>
-            <a:off x="2563824" y="2319670"/>
-            <a:ext cx="7064347" cy="3794897"/>
+        <p:spPr>
+          <a:xfrm>
+            <a:off x="1879010" y="2010110"/>
+            <a:ext cx="8435622" cy="4631322"/>
           </a:xfrm>
           <a:prstGeom prst="rect">
             <a:avLst/>
           </a:prstGeom>
-          <a:noFill/>
-          <a:extLst>
-            <a:ext uri="{909E8E84-426E-40DD-AFC4-6F175D3DCCD1}">
-              <a14:hiddenFill xmlns:a14="http://schemas.microsoft.com/office/drawing/2010/main">
-                <a:solidFill>
-                  <a:srgbClr val="FFFFFF"/>
-                </a:solidFill>
-              </a14:hiddenFill>
-            </a:ext>
-          </a:extLst>
         </p:spPr>
       </p:pic>
     </p:spTree>
@@ -7673,25 +7427,9 @@
   <p:clrMapOvr>
     <a:masterClrMapping/>
   </p:clrMapOvr>
-  <mc:AlternateContent xmlns:mc="http://schemas.openxmlformats.org/markup-compatibility/2006" xmlns:p14="http://schemas.microsoft.com/office/powerpoint/2010/main">
-    <mc:Choice Requires="p14">
-      <p:transition spd="slow" p14:dur="1500">
-        <p:cover dir="d"/>
-      </p:transition>
-    </mc:Choice>
-    <mc:Fallback xmlns="">
-      <p:transition spd="slow">
-        <p:cover dir="d"/>
-      </p:transition>
-    </mc:Fallback>
-  </mc:AlternateContent>
-  <p:timing>
-    <p:tnLst>
-      <p:par>
-        <p:cTn id="1" dur="indefinite" restart="never" nodeType="tmRoot"/>
-      </p:par>
-    </p:tnLst>
-  </p:timing>
+  <p:transition spd="slow">
+    <p:cover dir="d"/>
+  </p:transition>
 </p:sld>
 </file>
 
@@ -7831,25 +7569,9 @@
   <p:clrMapOvr>
     <a:masterClrMapping/>
   </p:clrMapOvr>
-  <mc:AlternateContent xmlns:mc="http://schemas.openxmlformats.org/markup-compatibility/2006" xmlns:p14="http://schemas.microsoft.com/office/powerpoint/2010/main">
-    <mc:Choice Requires="p14">
-      <p:transition spd="slow" p14:dur="1500">
-        <p:cover dir="d"/>
-      </p:transition>
-    </mc:Choice>
-    <mc:Fallback xmlns="">
-      <p:transition spd="slow">
-        <p:cover dir="d"/>
-      </p:transition>
-    </mc:Fallback>
-  </mc:AlternateContent>
-  <p:timing>
-    <p:tnLst>
-      <p:par>
-        <p:cTn id="1" dur="indefinite" restart="never" nodeType="tmRoot"/>
-      </p:par>
-    </p:tnLst>
-  </p:timing>
+  <p:transition spd="slow">
+    <p:cover dir="d"/>
+  </p:transition>
 </p:sld>
 </file>
 

</xml_diff>

<commit_message>
mensagem com dois s
</commit_message>
<xml_diff>
--- a/Trabalho Escrito & Banco de Dados/Trabalho de Conclusão de Curso - Health++.pptx
+++ b/Trabalho Escrito & Banco de Dados/Trabalho de Conclusão de Curso - Health++.pptx
@@ -281,7 +281,7 @@
           <a:p>
             <a:fld id="{04BA4C19-A2B5-45E9-89A1-7F815423A50E}" type="datetimeFigureOut">
               <a:rPr lang="pt-BR" smtClean="0"/>
-              <a:t>09/12/2022</a:t>
+              <a:t>06/12/2022</a:t>
             </a:fld>
             <a:endParaRPr lang="pt-BR"/>
           </a:p>
@@ -491,7 +491,7 @@
           <a:p>
             <a:fld id="{04BA4C19-A2B5-45E9-89A1-7F815423A50E}" type="datetimeFigureOut">
               <a:rPr lang="pt-BR" smtClean="0"/>
-              <a:t>09/12/2022</a:t>
+              <a:t>06/12/2022</a:t>
             </a:fld>
             <a:endParaRPr lang="pt-BR"/>
           </a:p>
@@ -711,7 +711,7 @@
           <a:p>
             <a:fld id="{04BA4C19-A2B5-45E9-89A1-7F815423A50E}" type="datetimeFigureOut">
               <a:rPr lang="pt-BR" smtClean="0"/>
-              <a:t>09/12/2022</a:t>
+              <a:t>06/12/2022</a:t>
             </a:fld>
             <a:endParaRPr lang="pt-BR"/>
           </a:p>
@@ -921,7 +921,7 @@
           <a:p>
             <a:fld id="{04BA4C19-A2B5-45E9-89A1-7F815423A50E}" type="datetimeFigureOut">
               <a:rPr lang="pt-BR" smtClean="0"/>
-              <a:t>09/12/2022</a:t>
+              <a:t>06/12/2022</a:t>
             </a:fld>
             <a:endParaRPr lang="pt-BR"/>
           </a:p>
@@ -1208,7 +1208,7 @@
           <a:p>
             <a:fld id="{04BA4C19-A2B5-45E9-89A1-7F815423A50E}" type="datetimeFigureOut">
               <a:rPr lang="pt-BR" smtClean="0"/>
-              <a:t>09/12/2022</a:t>
+              <a:t>06/12/2022</a:t>
             </a:fld>
             <a:endParaRPr lang="pt-BR"/>
           </a:p>
@@ -1485,7 +1485,7 @@
           <a:p>
             <a:fld id="{04BA4C19-A2B5-45E9-89A1-7F815423A50E}" type="datetimeFigureOut">
               <a:rPr lang="pt-BR" smtClean="0"/>
-              <a:t>09/12/2022</a:t>
+              <a:t>06/12/2022</a:t>
             </a:fld>
             <a:endParaRPr lang="pt-BR"/>
           </a:p>
@@ -1909,7 +1909,7 @@
           <a:p>
             <a:fld id="{04BA4C19-A2B5-45E9-89A1-7F815423A50E}" type="datetimeFigureOut">
               <a:rPr lang="pt-BR" smtClean="0"/>
-              <a:t>09/12/2022</a:t>
+              <a:t>06/12/2022</a:t>
             </a:fld>
             <a:endParaRPr lang="pt-BR"/>
           </a:p>
@@ -2062,7 +2062,7 @@
           <a:p>
             <a:fld id="{04BA4C19-A2B5-45E9-89A1-7F815423A50E}" type="datetimeFigureOut">
               <a:rPr lang="pt-BR" smtClean="0"/>
-              <a:t>09/12/2022</a:t>
+              <a:t>06/12/2022</a:t>
             </a:fld>
             <a:endParaRPr lang="pt-BR"/>
           </a:p>
@@ -2187,7 +2187,7 @@
           <a:p>
             <a:fld id="{04BA4C19-A2B5-45E9-89A1-7F815423A50E}" type="datetimeFigureOut">
               <a:rPr lang="pt-BR" smtClean="0"/>
-              <a:t>09/12/2022</a:t>
+              <a:t>06/12/2022</a:t>
             </a:fld>
             <a:endParaRPr lang="pt-BR"/>
           </a:p>
@@ -2510,7 +2510,7 @@
           <a:p>
             <a:fld id="{04BA4C19-A2B5-45E9-89A1-7F815423A50E}" type="datetimeFigureOut">
               <a:rPr lang="pt-BR" smtClean="0"/>
-              <a:t>09/12/2022</a:t>
+              <a:t>06/12/2022</a:t>
             </a:fld>
             <a:endParaRPr lang="pt-BR"/>
           </a:p>
@@ -2810,7 +2810,7 @@
           <a:p>
             <a:fld id="{04BA4C19-A2B5-45E9-89A1-7F815423A50E}" type="datetimeFigureOut">
               <a:rPr lang="pt-BR" smtClean="0"/>
-              <a:t>09/12/2022</a:t>
+              <a:t>06/12/2022</a:t>
             </a:fld>
             <a:endParaRPr lang="pt-BR"/>
           </a:p>
@@ -3063,7 +3063,7 @@
           <a:p>
             <a:fld id="{04BA4C19-A2B5-45E9-89A1-7F815423A50E}" type="datetimeFigureOut">
               <a:rPr lang="pt-BR" smtClean="0"/>
-              <a:t>09/12/2022</a:t>
+              <a:t>06/12/2022</a:t>
             </a:fld>
             <a:endParaRPr lang="pt-BR"/>
           </a:p>
@@ -7147,7 +7147,7 @@
       </p:sp>
       <p:pic>
         <p:nvPicPr>
-          <p:cNvPr id="6" name="Imagem 5"/>
+          <p:cNvPr id="5" name="Imagem 4"/>
           <p:cNvPicPr>
             <a:picLocks noChangeAspect="1"/>
           </p:cNvPicPr>
@@ -7167,8 +7167,8 @@
         </p:blipFill>
         <p:spPr>
           <a:xfrm>
-            <a:off x="1877366" y="2010111"/>
-            <a:ext cx="8287630" cy="4631322"/>
+            <a:off x="1961449" y="2010110"/>
+            <a:ext cx="8265117" cy="4618742"/>
           </a:xfrm>
           <a:prstGeom prst="rect">
             <a:avLst/>
@@ -7389,7 +7389,7 @@
       </p:sp>
       <p:pic>
         <p:nvPicPr>
-          <p:cNvPr id="6" name="Imagem 5"/>
+          <p:cNvPr id="5" name="Imagem 4"/>
           <p:cNvPicPr>
             <a:picLocks noChangeAspect="1"/>
           </p:cNvPicPr>
@@ -7409,8 +7409,8 @@
         </p:blipFill>
         <p:spPr>
           <a:xfrm>
-            <a:off x="1879010" y="2010110"/>
-            <a:ext cx="8435622" cy="4631322"/>
+            <a:off x="1803716" y="1939954"/>
+            <a:ext cx="8584564" cy="4713094"/>
           </a:xfrm>
           <a:prstGeom prst="rect">
             <a:avLst/>

</xml_diff>